<commit_message>
Fixing templates for Shivaratri and master
</commit_message>
<xml_diff>
--- a/WebContent/WEB-INF/templates/CSJ/prefix.pptx
+++ b/WebContent/WEB-INF/templates/CSJ/prefix.pptx
@@ -202,7 +202,7 @@
           <a:p>
             <a:fld id="{4A03472A-F286-9543-9F65-E88EC153A9C1}" type="datetimeFigureOut">
               <a:rPr lang="en-US" smtClean="0"/>
-              <a:t>1/6/19</a:t>
+              <a:t>2/17/19</a:t>
             </a:fld>
             <a:endParaRPr lang="en-US"/>
           </a:p>
@@ -551,7 +551,7 @@
           </a:ln>
           <a:extLst>
             <a:ext uri="{AF507438-7753-43e0-B8FC-AC1667EBCBE1}">
-              <a14:hiddenEffects xmlns:a14="http://schemas.microsoft.com/office/drawing/2010/main" xmlns="">
+              <a14:hiddenEffects xmlns="" xmlns:a14="http://schemas.microsoft.com/office/drawing/2010/main">
                 <a:effectLst>
                   <a:outerShdw blurRad="63500" dist="38099" dir="2700000" algn="ctr" rotWithShape="0">
                     <a:srgbClr val="000000">
@@ -586,14 +586,14 @@
           <a:ln/>
           <a:extLst>
             <a:ext uri="{909E8E84-426E-40dd-AFC4-6F175D3DCCD1}">
-              <a14:hiddenFill xmlns:a14="http://schemas.microsoft.com/office/drawing/2010/main" xmlns="">
+              <a14:hiddenFill xmlns="" xmlns:a14="http://schemas.microsoft.com/office/drawing/2010/main">
                 <a:solidFill>
                   <a:srgbClr val="FFFFFF"/>
                 </a:solidFill>
               </a14:hiddenFill>
             </a:ext>
             <a:ext uri="{91240B29-F687-4f45-9708-019B960494DF}">
-              <a14:hiddenLine xmlns:a14="http://schemas.microsoft.com/office/drawing/2010/main" xmlns="" w="9525" cap="flat">
+              <a14:hiddenLine xmlns="" xmlns:a14="http://schemas.microsoft.com/office/drawing/2010/main" w="9525" cap="flat">
                 <a:solidFill>
                   <a:srgbClr val="808080"/>
                 </a:solidFill>
@@ -603,7 +603,7 @@
               </a14:hiddenLine>
             </a:ext>
             <a:ext uri="{AF507438-7753-43e0-B8FC-AC1667EBCBE1}">
-              <a14:hiddenEffects xmlns:a14="http://schemas.microsoft.com/office/drawing/2010/main" xmlns="">
+              <a14:hiddenEffects xmlns="" xmlns:a14="http://schemas.microsoft.com/office/drawing/2010/main">
                 <a:effectLst>
                   <a:outerShdw blurRad="63500" dist="38099" dir="2700000" algn="ctr" rotWithShape="0">
                     <a:srgbClr val="000000">
@@ -718,7 +718,7 @@
           </a:ln>
           <a:extLst>
             <a:ext uri="{AF507438-7753-43e0-B8FC-AC1667EBCBE1}">
-              <a14:hiddenEffects xmlns:a14="http://schemas.microsoft.com/office/drawing/2010/main" xmlns="">
+              <a14:hiddenEffects xmlns="" xmlns:a14="http://schemas.microsoft.com/office/drawing/2010/main">
                 <a:effectLst>
                   <a:outerShdw blurRad="63500" dist="38099" dir="2700000" algn="ctr" rotWithShape="0">
                     <a:srgbClr val="000000">
@@ -753,14 +753,14 @@
           <a:ln/>
           <a:extLst>
             <a:ext uri="{909E8E84-426E-40dd-AFC4-6F175D3DCCD1}">
-              <a14:hiddenFill xmlns:a14="http://schemas.microsoft.com/office/drawing/2010/main" xmlns="">
+              <a14:hiddenFill xmlns="" xmlns:a14="http://schemas.microsoft.com/office/drawing/2010/main">
                 <a:solidFill>
                   <a:srgbClr val="FFFFFF"/>
                 </a:solidFill>
               </a14:hiddenFill>
             </a:ext>
             <a:ext uri="{91240B29-F687-4f45-9708-019B960494DF}">
-              <a14:hiddenLine xmlns:a14="http://schemas.microsoft.com/office/drawing/2010/main" xmlns="" w="9525" cap="flat">
+              <a14:hiddenLine xmlns="" xmlns:a14="http://schemas.microsoft.com/office/drawing/2010/main" w="9525" cap="flat">
                 <a:solidFill>
                   <a:srgbClr val="808080"/>
                 </a:solidFill>
@@ -770,7 +770,7 @@
               </a14:hiddenLine>
             </a:ext>
             <a:ext uri="{AF507438-7753-43e0-B8FC-AC1667EBCBE1}">
-              <a14:hiddenEffects xmlns:a14="http://schemas.microsoft.com/office/drawing/2010/main" xmlns="">
+              <a14:hiddenEffects xmlns="" xmlns:a14="http://schemas.microsoft.com/office/drawing/2010/main">
                 <a:effectLst>
                   <a:outerShdw blurRad="63500" dist="38099" dir="2700000" algn="ctr" rotWithShape="0">
                     <a:srgbClr val="000000">
@@ -1031,7 +1031,7 @@
           <a:p>
             <a:fld id="{D0EB8BDA-D505-2D4C-A404-933AA441AD23}" type="datetimeFigureOut">
               <a:rPr lang="en-US" smtClean="0"/>
-              <a:t>1/6/19</a:t>
+              <a:t>2/17/19</a:t>
             </a:fld>
             <a:endParaRPr lang="en-US"/>
           </a:p>
@@ -1239,7 +1239,7 @@
           <a:p>
             <a:fld id="{D0EB8BDA-D505-2D4C-A404-933AA441AD23}" type="datetimeFigureOut">
               <a:rPr lang="en-US" smtClean="0"/>
-              <a:t>1/6/19</a:t>
+              <a:t>2/17/19</a:t>
             </a:fld>
             <a:endParaRPr lang="en-US"/>
           </a:p>
@@ -1459,7 +1459,7 @@
           <a:p>
             <a:fld id="{5403ACA4-5A36-1D4B-9385-9AF87ADF2C6A}" type="datetimeFigureOut">
               <a:rPr lang="en-US" smtClean="0"/>
-              <a:t>1/6/19</a:t>
+              <a:t>2/17/19</a:t>
             </a:fld>
             <a:endParaRPr lang="en-US"/>
           </a:p>
@@ -1667,7 +1667,7 @@
           <a:p>
             <a:fld id="{5403ACA4-5A36-1D4B-9385-9AF87ADF2C6A}" type="datetimeFigureOut">
               <a:rPr lang="en-US" smtClean="0"/>
-              <a:t>1/6/19</a:t>
+              <a:t>2/17/19</a:t>
             </a:fld>
             <a:endParaRPr lang="en-US"/>
           </a:p>
@@ -1942,7 +1942,7 @@
           <a:p>
             <a:fld id="{5403ACA4-5A36-1D4B-9385-9AF87ADF2C6A}" type="datetimeFigureOut">
               <a:rPr lang="en-US" smtClean="0"/>
-              <a:t>1/6/19</a:t>
+              <a:t>2/17/19</a:t>
             </a:fld>
             <a:endParaRPr lang="en-US"/>
           </a:p>
@@ -2209,7 +2209,7 @@
           <a:p>
             <a:fld id="{5403ACA4-5A36-1D4B-9385-9AF87ADF2C6A}" type="datetimeFigureOut">
               <a:rPr lang="en-US" smtClean="0"/>
-              <a:t>1/6/19</a:t>
+              <a:t>2/17/19</a:t>
             </a:fld>
             <a:endParaRPr lang="en-US"/>
           </a:p>
@@ -2612,7 +2612,7 @@
           <a:p>
             <a:fld id="{5403ACA4-5A36-1D4B-9385-9AF87ADF2C6A}" type="datetimeFigureOut">
               <a:rPr lang="en-US" smtClean="0"/>
-              <a:t>1/6/19</a:t>
+              <a:t>2/17/19</a:t>
             </a:fld>
             <a:endParaRPr lang="en-US"/>
           </a:p>
@@ -2761,7 +2761,7 @@
           <a:p>
             <a:fld id="{5403ACA4-5A36-1D4B-9385-9AF87ADF2C6A}" type="datetimeFigureOut">
               <a:rPr lang="en-US" smtClean="0"/>
-              <a:t>1/6/19</a:t>
+              <a:t>2/17/19</a:t>
             </a:fld>
             <a:endParaRPr lang="en-US"/>
           </a:p>
@@ -2880,7 +2880,7 @@
           <a:p>
             <a:fld id="{5403ACA4-5A36-1D4B-9385-9AF87ADF2C6A}" type="datetimeFigureOut">
               <a:rPr lang="en-US" smtClean="0"/>
-              <a:t>1/6/19</a:t>
+              <a:t>2/17/19</a:t>
             </a:fld>
             <a:endParaRPr lang="en-US"/>
           </a:p>
@@ -3188,7 +3188,7 @@
           <a:p>
             <a:fld id="{5403ACA4-5A36-1D4B-9385-9AF87ADF2C6A}" type="datetimeFigureOut">
               <a:rPr lang="en-US" smtClean="0"/>
-              <a:t>1/6/19</a:t>
+              <a:t>2/17/19</a:t>
             </a:fld>
             <a:endParaRPr lang="en-US"/>
           </a:p>
@@ -3396,7 +3396,7 @@
           <a:p>
             <a:fld id="{D0EB8BDA-D505-2D4C-A404-933AA441AD23}" type="datetimeFigureOut">
               <a:rPr lang="en-US" smtClean="0"/>
-              <a:t>1/6/19</a:t>
+              <a:t>2/17/19</a:t>
             </a:fld>
             <a:endParaRPr lang="en-US"/>
           </a:p>
@@ -3681,7 +3681,7 @@
           <a:p>
             <a:fld id="{5403ACA4-5A36-1D4B-9385-9AF87ADF2C6A}" type="datetimeFigureOut">
               <a:rPr lang="en-US" smtClean="0"/>
-              <a:t>1/6/19</a:t>
+              <a:t>2/17/19</a:t>
             </a:fld>
             <a:endParaRPr lang="en-US"/>
           </a:p>
@@ -3889,7 +3889,7 @@
           <a:p>
             <a:fld id="{5403ACA4-5A36-1D4B-9385-9AF87ADF2C6A}" type="datetimeFigureOut">
               <a:rPr lang="en-US" smtClean="0"/>
-              <a:t>1/6/19</a:t>
+              <a:t>2/17/19</a:t>
             </a:fld>
             <a:endParaRPr lang="en-US"/>
           </a:p>
@@ -4097,7 +4097,7 @@
           <a:p>
             <a:fld id="{5403ACA4-5A36-1D4B-9385-9AF87ADF2C6A}" type="datetimeFigureOut">
               <a:rPr lang="en-US" smtClean="0"/>
-              <a:t>1/6/19</a:t>
+              <a:t>2/17/19</a:t>
             </a:fld>
             <a:endParaRPr lang="en-US"/>
           </a:p>
@@ -4305,7 +4305,7 @@
           <a:p>
             <a:fld id="{5403ACA4-5A36-1D4B-9385-9AF87ADF2C6A}" type="datetimeFigureOut">
               <a:rPr lang="en-US" smtClean="0"/>
-              <a:t>1/6/19</a:t>
+              <a:t>2/17/19</a:t>
             </a:fld>
             <a:endParaRPr lang="en-US"/>
           </a:p>
@@ -4470,7 +4470,7 @@
           <a:p>
             <a:fld id="{5403ACA4-5A36-1D4B-9385-9AF87ADF2C6A}" type="datetimeFigureOut">
               <a:rPr lang="en-US" smtClean="0"/>
-              <a:t>1/6/19</a:t>
+              <a:t>2/17/19</a:t>
             </a:fld>
             <a:endParaRPr lang="en-US"/>
           </a:p>
@@ -4709,7 +4709,7 @@
           <a:p>
             <a:fld id="{5403ACA4-5A36-1D4B-9385-9AF87ADF2C6A}" type="datetimeFigureOut">
               <a:rPr lang="en-US" smtClean="0"/>
-              <a:t>1/6/19</a:t>
+              <a:t>2/17/19</a:t>
             </a:fld>
             <a:endParaRPr lang="en-US"/>
           </a:p>
@@ -4936,7 +4936,7 @@
           <a:p>
             <a:fld id="{5403ACA4-5A36-1D4B-9385-9AF87ADF2C6A}" type="datetimeFigureOut">
               <a:rPr lang="en-US" smtClean="0"/>
-              <a:t>1/6/19</a:t>
+              <a:t>2/17/19</a:t>
             </a:fld>
             <a:endParaRPr lang="en-US"/>
           </a:p>
@@ -5298,7 +5298,7 @@
           <a:p>
             <a:fld id="{5403ACA4-5A36-1D4B-9385-9AF87ADF2C6A}" type="datetimeFigureOut">
               <a:rPr lang="en-US" smtClean="0"/>
-              <a:t>1/6/19</a:t>
+              <a:t>2/17/19</a:t>
             </a:fld>
             <a:endParaRPr lang="en-US"/>
           </a:p>
@@ -5411,7 +5411,7 @@
           <a:p>
             <a:fld id="{5403ACA4-5A36-1D4B-9385-9AF87ADF2C6A}" type="datetimeFigureOut">
               <a:rPr lang="en-US" smtClean="0"/>
-              <a:t>1/6/19</a:t>
+              <a:t>2/17/19</a:t>
             </a:fld>
             <a:endParaRPr lang="en-US"/>
           </a:p>
@@ -5501,7 +5501,7 @@
           <a:p>
             <a:fld id="{5403ACA4-5A36-1D4B-9385-9AF87ADF2C6A}" type="datetimeFigureOut">
               <a:rPr lang="en-US" smtClean="0"/>
-              <a:t>1/6/19</a:t>
+              <a:t>2/17/19</a:t>
             </a:fld>
             <a:endParaRPr lang="en-US"/>
           </a:p>
@@ -5755,7 +5755,7 @@
           <a:p>
             <a:fld id="{D0EB8BDA-D505-2D4C-A404-933AA441AD23}" type="datetimeFigureOut">
               <a:rPr lang="en-US" smtClean="0"/>
-              <a:t>1/6/19</a:t>
+              <a:t>2/17/19</a:t>
             </a:fld>
             <a:endParaRPr lang="en-US"/>
           </a:p>
@@ -6048,7 +6048,7 @@
           <a:p>
             <a:fld id="{5403ACA4-5A36-1D4B-9385-9AF87ADF2C6A}" type="datetimeFigureOut">
               <a:rPr lang="en-US" smtClean="0"/>
-              <a:t>1/6/19</a:t>
+              <a:t>2/17/19</a:t>
             </a:fld>
             <a:endParaRPr lang="en-US"/>
           </a:p>
@@ -6300,7 +6300,7 @@
           <a:p>
             <a:fld id="{5403ACA4-5A36-1D4B-9385-9AF87ADF2C6A}" type="datetimeFigureOut">
               <a:rPr lang="en-US" smtClean="0"/>
-              <a:t>1/6/19</a:t>
+              <a:t>2/17/19</a:t>
             </a:fld>
             <a:endParaRPr lang="en-US"/>
           </a:p>
@@ -6465,7 +6465,7 @@
           <a:p>
             <a:fld id="{5403ACA4-5A36-1D4B-9385-9AF87ADF2C6A}" type="datetimeFigureOut">
               <a:rPr lang="en-US" smtClean="0"/>
-              <a:t>1/6/19</a:t>
+              <a:t>2/17/19</a:t>
             </a:fld>
             <a:endParaRPr lang="en-US"/>
           </a:p>
@@ -6640,7 +6640,7 @@
           <a:p>
             <a:fld id="{5403ACA4-5A36-1D4B-9385-9AF87ADF2C6A}" type="datetimeFigureOut">
               <a:rPr lang="en-US" smtClean="0"/>
-              <a:t>1/6/19</a:t>
+              <a:t>2/17/19</a:t>
             </a:fld>
             <a:endParaRPr lang="en-US"/>
           </a:p>
@@ -6886,7 +6886,7 @@
           <a:p>
             <a:fld id="{D0EB8BDA-D505-2D4C-A404-933AA441AD23}" type="datetimeFigureOut">
               <a:rPr lang="en-US" smtClean="0"/>
-              <a:t>1/6/19</a:t>
+              <a:t>2/17/19</a:t>
             </a:fld>
             <a:endParaRPr lang="en-US"/>
           </a:p>
@@ -7289,7 +7289,7 @@
           <a:p>
             <a:fld id="{D0EB8BDA-D505-2D4C-A404-933AA441AD23}" type="datetimeFigureOut">
               <a:rPr lang="en-US" smtClean="0"/>
-              <a:t>1/6/19</a:t>
+              <a:t>2/17/19</a:t>
             </a:fld>
             <a:endParaRPr lang="en-US"/>
           </a:p>
@@ -7438,7 +7438,7 @@
           <a:p>
             <a:fld id="{D0EB8BDA-D505-2D4C-A404-933AA441AD23}" type="datetimeFigureOut">
               <a:rPr lang="en-US" smtClean="0"/>
-              <a:t>1/6/19</a:t>
+              <a:t>2/17/19</a:t>
             </a:fld>
             <a:endParaRPr lang="en-US"/>
           </a:p>
@@ -7557,7 +7557,7 @@
           <a:p>
             <a:fld id="{D0EB8BDA-D505-2D4C-A404-933AA441AD23}" type="datetimeFigureOut">
               <a:rPr lang="en-US" smtClean="0"/>
-              <a:t>1/6/19</a:t>
+              <a:t>2/17/19</a:t>
             </a:fld>
             <a:endParaRPr lang="en-US"/>
           </a:p>
@@ -7865,7 +7865,7 @@
           <a:p>
             <a:fld id="{D0EB8BDA-D505-2D4C-A404-933AA441AD23}" type="datetimeFigureOut">
               <a:rPr lang="en-US" smtClean="0"/>
-              <a:t>1/6/19</a:t>
+              <a:t>2/17/19</a:t>
             </a:fld>
             <a:endParaRPr lang="en-US"/>
           </a:p>
@@ -8150,7 +8150,7 @@
           <a:p>
             <a:fld id="{D0EB8BDA-D505-2D4C-A404-933AA441AD23}" type="datetimeFigureOut">
               <a:rPr lang="en-US" smtClean="0"/>
-              <a:t>1/6/19</a:t>
+              <a:t>2/17/19</a:t>
             </a:fld>
             <a:endParaRPr lang="en-US"/>
           </a:p>
@@ -9091,7 +9091,7 @@
           <a:p>
             <a:fld id="{C764DE79-268F-4C1A-8933-263129D2AF90}" type="datetimeFigureOut">
               <a:rPr lang="en-US" dirty="0"/>
-              <a:t>1/6/19</a:t>
+              <a:t>2/17/19</a:t>
             </a:fld>
             <a:endParaRPr lang="en-US" dirty="0"/>
           </a:p>
@@ -9532,7 +9532,7 @@
           <a:effectLst/>
           <a:extLst>
             <a:ext uri="{909E8E84-426E-40dd-AFC4-6F175D3DCCD1}">
-              <a14:hiddenFill xmlns:a14="http://schemas.microsoft.com/office/drawing/2010/main" xmlns="">
+              <a14:hiddenFill xmlns="" xmlns:a14="http://schemas.microsoft.com/office/drawing/2010/main">
                 <a:blipFill dpi="0" rotWithShape="0">
                   <a:blip/>
                   <a:srcRect/>
@@ -9543,7 +9543,7 @@
               </a14:hiddenFill>
             </a:ext>
             <a:ext uri="{91240B29-F687-4f45-9708-019B960494DF}">
-              <a14:hiddenLine xmlns:a14="http://schemas.microsoft.com/office/drawing/2010/main" xmlns="" w="9525" cap="flat">
+              <a14:hiddenLine xmlns="" xmlns:a14="http://schemas.microsoft.com/office/drawing/2010/main" w="9525" cap="flat">
                 <a:solidFill>
                   <a:srgbClr val="808080"/>
                 </a:solidFill>
@@ -9553,7 +9553,7 @@
               </a14:hiddenLine>
             </a:ext>
             <a:ext uri="{AF507438-7753-43e0-B8FC-AC1667EBCBE1}">
-              <a14:hiddenEffects xmlns:a14="http://schemas.microsoft.com/office/drawing/2010/main" xmlns="">
+              <a14:hiddenEffects xmlns="" xmlns:a14="http://schemas.microsoft.com/office/drawing/2010/main">
                 <a:effectLst>
                   <a:outerShdw blurRad="63500" dist="38099" dir="2700000" algn="ctr" rotWithShape="0">
                     <a:srgbClr val="000000">
@@ -9591,7 +9591,7 @@
           <a:effectLst/>
           <a:extLst>
             <a:ext uri="{91240B29-F687-4f45-9708-019B960494DF}">
-              <a14:hiddenLine xmlns:a14="http://schemas.microsoft.com/office/drawing/2010/main" xmlns="" w="25560" cap="flat">
+              <a14:hiddenLine xmlns="" xmlns:a14="http://schemas.microsoft.com/office/drawing/2010/main" w="25560" cap="flat">
                 <a:solidFill>
                   <a:srgbClr val="808080"/>
                 </a:solidFill>
@@ -9601,7 +9601,7 @@
               </a14:hiddenLine>
             </a:ext>
             <a:ext uri="{AF507438-7753-43e0-B8FC-AC1667EBCBE1}">
-              <a14:hiddenEffects xmlns:a14="http://schemas.microsoft.com/office/drawing/2010/main" xmlns="">
+              <a14:hiddenEffects xmlns="" xmlns:a14="http://schemas.microsoft.com/office/drawing/2010/main">
                 <a:effectLst>
                   <a:outerShdw blurRad="63500" dist="38099" dir="2700000" algn="ctr" rotWithShape="0">
                     <a:srgbClr val="000000">
@@ -9618,6 +9618,48 @@
           <a:lstStyle/>
           <a:p>
             <a:endParaRPr lang="en-US"/>
+          </a:p>
+        </p:txBody>
+      </p:sp>
+      <p:sp>
+        <p:nvSpPr>
+          <p:cNvPr id="2" name="TextBox 1">
+            <a:extLst>
+              <a:ext uri="{FF2B5EF4-FFF2-40B4-BE49-F238E27FC236}">
+                <a16:creationId xmlns:a16="http://schemas.microsoft.com/office/drawing/2014/main" id="{A9106589-7D09-7C40-9058-231950D2453D}"/>
+              </a:ext>
+            </a:extLst>
+          </p:cNvPr>
+          <p:cNvSpPr txBox="1"/>
+          <p:nvPr/>
+        </p:nvSpPr>
+        <p:spPr>
+          <a:xfrm>
+            <a:off x="0" y="32655"/>
+            <a:ext cx="9144000" cy="646331"/>
+          </a:xfrm>
+          <a:prstGeom prst="rect">
+            <a:avLst/>
+          </a:prstGeom>
+          <a:solidFill>
+            <a:schemeClr val="tx1"/>
+          </a:solidFill>
+        </p:spPr>
+        <p:txBody>
+          <a:bodyPr wrap="square" rtlCol="0">
+            <a:spAutoFit/>
+          </a:bodyPr>
+          <a:lstStyle/>
+          <a:p>
+            <a:pPr algn="ctr"/>
+            <a:r>
+              <a:rPr lang="en-US" sz="3600" b="1" dirty="0">
+                <a:solidFill>
+                  <a:schemeClr val="bg1"/>
+                </a:solidFill>
+              </a:rPr>
+              <a:t>Sathya Sai Baba Center of Central San Jose</a:t>
+            </a:r>
           </a:p>
         </p:txBody>
       </p:sp>
@@ -9884,14 +9926,14 @@
           </a:ln>
           <a:extLst>
             <a:ext uri="{909E8E84-426E-40dd-AFC4-6F175D3DCCD1}">
-              <a14:hiddenFill xmlns:a14="http://schemas.microsoft.com/office/drawing/2010/main" xmlns="">
+              <a14:hiddenFill xmlns="" xmlns:a14="http://schemas.microsoft.com/office/drawing/2010/main">
                 <a:solidFill>
                   <a:srgbClr val="FFFFFF"/>
                 </a:solidFill>
               </a14:hiddenFill>
             </a:ext>
             <a:ext uri="{91240B29-F687-4f45-9708-019B960494DF}">
-              <a14:hiddenLine xmlns:a14="http://schemas.microsoft.com/office/drawing/2010/main" xmlns="" w="9525">
+              <a14:hiddenLine xmlns="" xmlns:a14="http://schemas.microsoft.com/office/drawing/2010/main" w="9525">
                 <a:solidFill>
                   <a:srgbClr val="000000"/>
                 </a:solidFill>

</xml_diff>